<commit_message>
Updating the landscape patch analysis to run by spatial block unit for the Southern Rockies
</commit_message>
<xml_diff>
--- a/Aim1/figures/workflow2.pptx
+++ b/Aim1/figures/workflow2.pptx
@@ -104,7 +104,273 @@
       </a:defRPr>
     </a:lvl9pPr>
   </p:defaultTextStyle>
+  <p:extLst>
+    <p:ext uri="{EFAFB233-063F-42B5-8137-9DF3F51BA10A}">
+      <p15:sldGuideLst xmlns:p15="http://schemas.microsoft.com/office/powerpoint/2012/main"/>
+    </p:ext>
+  </p:extLst>
 </p:presentation>
+</file>
+
+<file path=ppt/revisionInfo.xml><?xml version="1.0" encoding="utf-8"?>
+<p1510:revInfo xmlns:a="http://schemas.openxmlformats.org/drawingml/2006/main" xmlns:r="http://schemas.openxmlformats.org/officeDocument/2006/relationships" xmlns:p1510="http://schemas.microsoft.com/office/powerpoint/2015/10/main">
+  <p1510:revLst>
+    <p1510:client id="{DEB65CA8-5B04-EC44-9282-444D7E3E30DF}" v="13" dt="2024-02-09T16:43:54.481"/>
+  </p1510:revLst>
+</p1510:revInfo>
+</file>
+
+<file path=ppt/changesInfos/changesInfo1.xml><?xml version="1.0" encoding="utf-8"?>
+<pc:chgInfo xmlns:a="http://schemas.openxmlformats.org/drawingml/2006/main" xmlns:r="http://schemas.openxmlformats.org/officeDocument/2006/relationships" xmlns:ac="http://schemas.microsoft.com/office/drawing/2013/main/command" xmlns:pc="http://schemas.microsoft.com/office/powerpoint/2013/main/command">
+  <pc:docChgLst>
+    <pc:chgData name="Maxwell Cook" userId="6270a8f4b8f62cae" providerId="LiveId" clId="{DEB65CA8-5B04-EC44-9282-444D7E3E30DF}"/>
+    <pc:docChg chg="undo custSel modSld">
+      <pc:chgData name="Maxwell Cook" userId="6270a8f4b8f62cae" providerId="LiveId" clId="{DEB65CA8-5B04-EC44-9282-444D7E3E30DF}" dt="2024-02-09T16:44:15.212" v="249" actId="1076"/>
+      <pc:docMkLst>
+        <pc:docMk/>
+      </pc:docMkLst>
+      <pc:sldChg chg="addSp modSp mod">
+        <pc:chgData name="Maxwell Cook" userId="6270a8f4b8f62cae" providerId="LiveId" clId="{DEB65CA8-5B04-EC44-9282-444D7E3E30DF}" dt="2024-02-09T16:44:15.212" v="249" actId="1076"/>
+        <pc:sldMkLst>
+          <pc:docMk/>
+          <pc:sldMk cId="2798424578" sldId="256"/>
+        </pc:sldMkLst>
+        <pc:spChg chg="mod">
+          <ac:chgData name="Maxwell Cook" userId="6270a8f4b8f62cae" providerId="LiveId" clId="{DEB65CA8-5B04-EC44-9282-444D7E3E30DF}" dt="2024-02-09T16:31:33.685" v="240" actId="1076"/>
+          <ac:spMkLst>
+            <pc:docMk/>
+            <pc:sldMk cId="2798424578" sldId="256"/>
+            <ac:spMk id="4" creationId="{4A48820F-BAD9-1733-A4D1-1F95B40F7358}"/>
+          </ac:spMkLst>
+        </pc:spChg>
+        <pc:spChg chg="mod">
+          <ac:chgData name="Maxwell Cook" userId="6270a8f4b8f62cae" providerId="LiveId" clId="{DEB65CA8-5B04-EC44-9282-444D7E3E30DF}" dt="2024-02-09T16:31:33.685" v="240" actId="1076"/>
+          <ac:spMkLst>
+            <pc:docMk/>
+            <pc:sldMk cId="2798424578" sldId="256"/>
+            <ac:spMk id="5" creationId="{AED92539-440D-35F4-A11A-7D855CCFEB50}"/>
+          </ac:spMkLst>
+        </pc:spChg>
+        <pc:spChg chg="mod">
+          <ac:chgData name="Maxwell Cook" userId="6270a8f4b8f62cae" providerId="LiveId" clId="{DEB65CA8-5B04-EC44-9282-444D7E3E30DF}" dt="2024-02-09T16:44:15.212" v="249" actId="1076"/>
+          <ac:spMkLst>
+            <pc:docMk/>
+            <pc:sldMk cId="2798424578" sldId="256"/>
+            <ac:spMk id="7" creationId="{CA17ACF7-A008-2E15-15A4-695D88F22143}"/>
+          </ac:spMkLst>
+        </pc:spChg>
+        <pc:spChg chg="mod">
+          <ac:chgData name="Maxwell Cook" userId="6270a8f4b8f62cae" providerId="LiveId" clId="{DEB65CA8-5B04-EC44-9282-444D7E3E30DF}" dt="2024-02-09T16:31:33.685" v="240" actId="1076"/>
+          <ac:spMkLst>
+            <pc:docMk/>
+            <pc:sldMk cId="2798424578" sldId="256"/>
+            <ac:spMk id="10" creationId="{A27C95AC-463C-7048-A0B9-7A9B2DD99C98}"/>
+          </ac:spMkLst>
+        </pc:spChg>
+        <pc:spChg chg="mod">
+          <ac:chgData name="Maxwell Cook" userId="6270a8f4b8f62cae" providerId="LiveId" clId="{DEB65CA8-5B04-EC44-9282-444D7E3E30DF}" dt="2024-02-09T16:31:33.685" v="240" actId="1076"/>
+          <ac:spMkLst>
+            <pc:docMk/>
+            <pc:sldMk cId="2798424578" sldId="256"/>
+            <ac:spMk id="11" creationId="{817978DE-4116-3E68-44C2-73CDBFAC024D}"/>
+          </ac:spMkLst>
+        </pc:spChg>
+        <pc:spChg chg="mod">
+          <ac:chgData name="Maxwell Cook" userId="6270a8f4b8f62cae" providerId="LiveId" clId="{DEB65CA8-5B04-EC44-9282-444D7E3E30DF}" dt="2024-02-09T16:31:33.685" v="240" actId="1076"/>
+          <ac:spMkLst>
+            <pc:docMk/>
+            <pc:sldMk cId="2798424578" sldId="256"/>
+            <ac:spMk id="12" creationId="{F9E3C43F-91F8-3834-A7F7-701EBC21FC9A}"/>
+          </ac:spMkLst>
+        </pc:spChg>
+        <pc:spChg chg="mod">
+          <ac:chgData name="Maxwell Cook" userId="6270a8f4b8f62cae" providerId="LiveId" clId="{DEB65CA8-5B04-EC44-9282-444D7E3E30DF}" dt="2024-02-09T16:31:33.685" v="240" actId="1076"/>
+          <ac:spMkLst>
+            <pc:docMk/>
+            <pc:sldMk cId="2798424578" sldId="256"/>
+            <ac:spMk id="15" creationId="{53A601F6-653C-07AC-0270-0ADDEF631D4C}"/>
+          </ac:spMkLst>
+        </pc:spChg>
+        <pc:spChg chg="mod">
+          <ac:chgData name="Maxwell Cook" userId="6270a8f4b8f62cae" providerId="LiveId" clId="{DEB65CA8-5B04-EC44-9282-444D7E3E30DF}" dt="2024-02-09T16:43:05.775" v="242" actId="1076"/>
+          <ac:spMkLst>
+            <pc:docMk/>
+            <pc:sldMk cId="2798424578" sldId="256"/>
+            <ac:spMk id="16" creationId="{B8D43C57-D933-7AF7-B431-78D2ED65CAC2}"/>
+          </ac:spMkLst>
+        </pc:spChg>
+        <pc:spChg chg="mod">
+          <ac:chgData name="Maxwell Cook" userId="6270a8f4b8f62cae" providerId="LiveId" clId="{DEB65CA8-5B04-EC44-9282-444D7E3E30DF}" dt="2024-02-09T16:29:11.737" v="172" actId="1076"/>
+          <ac:spMkLst>
+            <pc:docMk/>
+            <pc:sldMk cId="2798424578" sldId="256"/>
+            <ac:spMk id="17" creationId="{A550D470-1BC7-57F0-2CF0-8D403ADDBB73}"/>
+          </ac:spMkLst>
+        </pc:spChg>
+        <pc:spChg chg="mod">
+          <ac:chgData name="Maxwell Cook" userId="6270a8f4b8f62cae" providerId="LiveId" clId="{DEB65CA8-5B04-EC44-9282-444D7E3E30DF}" dt="2024-02-09T16:42:55.167" v="241" actId="1076"/>
+          <ac:spMkLst>
+            <pc:docMk/>
+            <pc:sldMk cId="2798424578" sldId="256"/>
+            <ac:spMk id="18" creationId="{B7FF7AC5-C2BB-8AC4-5D58-A81160C2CFA9}"/>
+          </ac:spMkLst>
+        </pc:spChg>
+        <pc:spChg chg="mod">
+          <ac:chgData name="Maxwell Cook" userId="6270a8f4b8f62cae" providerId="LiveId" clId="{DEB65CA8-5B04-EC44-9282-444D7E3E30DF}" dt="2024-02-09T16:42:55.167" v="241" actId="1076"/>
+          <ac:spMkLst>
+            <pc:docMk/>
+            <pc:sldMk cId="2798424578" sldId="256"/>
+            <ac:spMk id="19" creationId="{C9AD8ED1-657B-3525-92DB-7E5FC6D788B7}"/>
+          </ac:spMkLst>
+        </pc:spChg>
+        <pc:spChg chg="mod">
+          <ac:chgData name="Maxwell Cook" userId="6270a8f4b8f62cae" providerId="LiveId" clId="{DEB65CA8-5B04-EC44-9282-444D7E3E30DF}" dt="2024-02-09T16:42:55.167" v="241" actId="1076"/>
+          <ac:spMkLst>
+            <pc:docMk/>
+            <pc:sldMk cId="2798424578" sldId="256"/>
+            <ac:spMk id="20" creationId="{C8BE040D-8A2F-4A3F-3547-249721478054}"/>
+          </ac:spMkLst>
+        </pc:spChg>
+        <pc:spChg chg="mod">
+          <ac:chgData name="Maxwell Cook" userId="6270a8f4b8f62cae" providerId="LiveId" clId="{DEB65CA8-5B04-EC44-9282-444D7E3E30DF}" dt="2024-02-09T16:42:55.167" v="241" actId="1076"/>
+          <ac:spMkLst>
+            <pc:docMk/>
+            <pc:sldMk cId="2798424578" sldId="256"/>
+            <ac:spMk id="21" creationId="{A4E4BA02-1B3D-D3A6-0654-064758759438}"/>
+          </ac:spMkLst>
+        </pc:spChg>
+        <pc:spChg chg="mod">
+          <ac:chgData name="Maxwell Cook" userId="6270a8f4b8f62cae" providerId="LiveId" clId="{DEB65CA8-5B04-EC44-9282-444D7E3E30DF}" dt="2024-02-09T16:28:11.687" v="100" actId="1076"/>
+          <ac:spMkLst>
+            <pc:docMk/>
+            <pc:sldMk cId="2798424578" sldId="256"/>
+            <ac:spMk id="22" creationId="{74819C2B-1F31-6E4B-9121-9395BA892760}"/>
+          </ac:spMkLst>
+        </pc:spChg>
+        <pc:spChg chg="mod">
+          <ac:chgData name="Maxwell Cook" userId="6270a8f4b8f62cae" providerId="LiveId" clId="{DEB65CA8-5B04-EC44-9282-444D7E3E30DF}" dt="2024-02-09T16:42:55.167" v="241" actId="1076"/>
+          <ac:spMkLst>
+            <pc:docMk/>
+            <pc:sldMk cId="2798424578" sldId="256"/>
+            <ac:spMk id="23" creationId="{128CF8AA-F99A-D08E-E914-A2377ED9266D}"/>
+          </ac:spMkLst>
+        </pc:spChg>
+        <pc:spChg chg="mod">
+          <ac:chgData name="Maxwell Cook" userId="6270a8f4b8f62cae" providerId="LiveId" clId="{DEB65CA8-5B04-EC44-9282-444D7E3E30DF}" dt="2024-02-09T16:31:33.685" v="240" actId="1076"/>
+          <ac:spMkLst>
+            <pc:docMk/>
+            <pc:sldMk cId="2798424578" sldId="256"/>
+            <ac:spMk id="24" creationId="{6EDA4675-8316-592D-0801-995B66611974}"/>
+          </ac:spMkLst>
+        </pc:spChg>
+        <pc:spChg chg="mod">
+          <ac:chgData name="Maxwell Cook" userId="6270a8f4b8f62cae" providerId="LiveId" clId="{DEB65CA8-5B04-EC44-9282-444D7E3E30DF}" dt="2024-02-09T16:42:55.167" v="241" actId="1076"/>
+          <ac:spMkLst>
+            <pc:docMk/>
+            <pc:sldMk cId="2798424578" sldId="256"/>
+            <ac:spMk id="25" creationId="{9499718F-ACAB-05E8-02BD-C2B51E80B6AD}"/>
+          </ac:spMkLst>
+        </pc:spChg>
+        <pc:spChg chg="add mod">
+          <ac:chgData name="Maxwell Cook" userId="6270a8f4b8f62cae" providerId="LiveId" clId="{DEB65CA8-5B04-EC44-9282-444D7E3E30DF}" dt="2024-02-09T16:42:55.167" v="241" actId="1076"/>
+          <ac:spMkLst>
+            <pc:docMk/>
+            <pc:sldMk cId="2798424578" sldId="256"/>
+            <ac:spMk id="59" creationId="{50D8BCC4-1743-E752-4A40-DDE8A6F05112}"/>
+          </ac:spMkLst>
+        </pc:spChg>
+        <pc:spChg chg="add mod">
+          <ac:chgData name="Maxwell Cook" userId="6270a8f4b8f62cae" providerId="LiveId" clId="{DEB65CA8-5B04-EC44-9282-444D7E3E30DF}" dt="2024-02-09T16:28:44.682" v="142" actId="14100"/>
+          <ac:spMkLst>
+            <pc:docMk/>
+            <pc:sldMk cId="2798424578" sldId="256"/>
+            <ac:spMk id="63" creationId="{C78F6C3A-42A6-2EDA-D7BF-BCF3EEEBE142}"/>
+          </ac:spMkLst>
+        </pc:spChg>
+        <pc:spChg chg="add mod">
+          <ac:chgData name="Maxwell Cook" userId="6270a8f4b8f62cae" providerId="LiveId" clId="{DEB65CA8-5B04-EC44-9282-444D7E3E30DF}" dt="2024-02-09T16:28:52.717" v="145" actId="1076"/>
+          <ac:spMkLst>
+            <pc:docMk/>
+            <pc:sldMk cId="2798424578" sldId="256"/>
+            <ac:spMk id="64" creationId="{04E8CCE8-4357-3EDD-4E54-C5A7428DA336}"/>
+          </ac:spMkLst>
+        </pc:spChg>
+        <pc:spChg chg="add mod">
+          <ac:chgData name="Maxwell Cook" userId="6270a8f4b8f62cae" providerId="LiveId" clId="{DEB65CA8-5B04-EC44-9282-444D7E3E30DF}" dt="2024-02-09T16:29:49.338" v="227" actId="1076"/>
+          <ac:spMkLst>
+            <pc:docMk/>
+            <pc:sldMk cId="2798424578" sldId="256"/>
+            <ac:spMk id="65" creationId="{C78F2338-0420-B816-58C1-4676F3E5E4D1}"/>
+          </ac:spMkLst>
+        </pc:spChg>
+        <pc:cxnChg chg="add mod">
+          <ac:chgData name="Maxwell Cook" userId="6270a8f4b8f62cae" providerId="LiveId" clId="{DEB65CA8-5B04-EC44-9282-444D7E3E30DF}" dt="2024-02-09T16:44:15.212" v="249" actId="1076"/>
+          <ac:cxnSpMkLst>
+            <pc:docMk/>
+            <pc:sldMk cId="2798424578" sldId="256"/>
+            <ac:cxnSpMk id="3" creationId="{3F3BAC37-2094-BBB9-E04F-B3D2DF0F4E1B}"/>
+          </ac:cxnSpMkLst>
+        </pc:cxnChg>
+        <pc:cxnChg chg="add mod">
+          <ac:chgData name="Maxwell Cook" userId="6270a8f4b8f62cae" providerId="LiveId" clId="{DEB65CA8-5B04-EC44-9282-444D7E3E30DF}" dt="2024-02-09T16:31:33.685" v="240" actId="1076"/>
+          <ac:cxnSpMkLst>
+            <pc:docMk/>
+            <pc:sldMk cId="2798424578" sldId="256"/>
+            <ac:cxnSpMk id="8" creationId="{263E2082-D57A-5C05-3646-F7F5F4D90CF4}"/>
+          </ac:cxnSpMkLst>
+        </pc:cxnChg>
+        <pc:cxnChg chg="add mod">
+          <ac:chgData name="Maxwell Cook" userId="6270a8f4b8f62cae" providerId="LiveId" clId="{DEB65CA8-5B04-EC44-9282-444D7E3E30DF}" dt="2024-02-09T16:31:33.685" v="240" actId="1076"/>
+          <ac:cxnSpMkLst>
+            <pc:docMk/>
+            <pc:sldMk cId="2798424578" sldId="256"/>
+            <ac:cxnSpMk id="9" creationId="{8DEE4B27-DE7C-5D52-C955-5ADEE721A328}"/>
+          </ac:cxnSpMkLst>
+        </pc:cxnChg>
+        <pc:cxnChg chg="add mod">
+          <ac:chgData name="Maxwell Cook" userId="6270a8f4b8f62cae" providerId="LiveId" clId="{DEB65CA8-5B04-EC44-9282-444D7E3E30DF}" dt="2024-02-09T16:42:55.167" v="241" actId="1076"/>
+          <ac:cxnSpMkLst>
+            <pc:docMk/>
+            <pc:sldMk cId="2798424578" sldId="256"/>
+            <ac:cxnSpMk id="37" creationId="{A4624795-A35A-64AF-D646-358DE5218539}"/>
+          </ac:cxnSpMkLst>
+        </pc:cxnChg>
+        <pc:cxnChg chg="add mod">
+          <ac:chgData name="Maxwell Cook" userId="6270a8f4b8f62cae" providerId="LiveId" clId="{DEB65CA8-5B04-EC44-9282-444D7E3E30DF}" dt="2024-02-09T16:42:55.167" v="241" actId="1076"/>
+          <ac:cxnSpMkLst>
+            <pc:docMk/>
+            <pc:sldMk cId="2798424578" sldId="256"/>
+            <ac:cxnSpMk id="38" creationId="{8AD4F4AD-107B-E967-26FE-0E945C9212E1}"/>
+          </ac:cxnSpMkLst>
+        </pc:cxnChg>
+        <pc:cxnChg chg="add mod">
+          <ac:chgData name="Maxwell Cook" userId="6270a8f4b8f62cae" providerId="LiveId" clId="{DEB65CA8-5B04-EC44-9282-444D7E3E30DF}" dt="2024-02-09T16:42:55.167" v="241" actId="1076"/>
+          <ac:cxnSpMkLst>
+            <pc:docMk/>
+            <pc:sldMk cId="2798424578" sldId="256"/>
+            <ac:cxnSpMk id="43" creationId="{CAE9E58C-5992-6DBA-2374-C1F90D18897A}"/>
+          </ac:cxnSpMkLst>
+        </pc:cxnChg>
+        <pc:cxnChg chg="add mod">
+          <ac:chgData name="Maxwell Cook" userId="6270a8f4b8f62cae" providerId="LiveId" clId="{DEB65CA8-5B04-EC44-9282-444D7E3E30DF}" dt="2024-02-09T16:43:05.775" v="242" actId="1076"/>
+          <ac:cxnSpMkLst>
+            <pc:docMk/>
+            <pc:sldMk cId="2798424578" sldId="256"/>
+            <ac:cxnSpMk id="47" creationId="{A90A21E9-D198-9A68-E578-24BF7FF4743A}"/>
+          </ac:cxnSpMkLst>
+        </pc:cxnChg>
+        <pc:cxnChg chg="add mod">
+          <ac:chgData name="Maxwell Cook" userId="6270a8f4b8f62cae" providerId="LiveId" clId="{DEB65CA8-5B04-EC44-9282-444D7E3E30DF}" dt="2024-02-09T16:42:55.167" v="241" actId="1076"/>
+          <ac:cxnSpMkLst>
+            <pc:docMk/>
+            <pc:sldMk cId="2798424578" sldId="256"/>
+            <ac:cxnSpMk id="60" creationId="{9B84BB9C-6235-7A08-31ED-088F49A67F8F}"/>
+          </ac:cxnSpMkLst>
+        </pc:cxnChg>
+      </pc:sldChg>
+    </pc:docChg>
+  </pc:docChgLst>
+</pc:chgInfo>
 </file>
 
 <file path=ppt/slideLayouts/slideLayout1.xml><?xml version="1.0" encoding="utf-8"?>
@@ -238,7 +504,7 @@
           <a:p>
             <a:fld id="{91353608-A776-6549-A742-07A412CA6493}" type="datetimeFigureOut">
               <a:rPr lang="en-US" smtClean="0"/>
-              <a:t>2/7/24</a:t>
+              <a:t>2/9/24</a:t>
             </a:fld>
             <a:endParaRPr lang="en-US"/>
           </a:p>
@@ -408,7 +674,7 @@
           <a:p>
             <a:fld id="{91353608-A776-6549-A742-07A412CA6493}" type="datetimeFigureOut">
               <a:rPr lang="en-US" smtClean="0"/>
-              <a:t>2/7/24</a:t>
+              <a:t>2/9/24</a:t>
             </a:fld>
             <a:endParaRPr lang="en-US"/>
           </a:p>
@@ -588,7 +854,7 @@
           <a:p>
             <a:fld id="{91353608-A776-6549-A742-07A412CA6493}" type="datetimeFigureOut">
               <a:rPr lang="en-US" smtClean="0"/>
-              <a:t>2/7/24</a:t>
+              <a:t>2/9/24</a:t>
             </a:fld>
             <a:endParaRPr lang="en-US"/>
           </a:p>
@@ -758,7 +1024,7 @@
           <a:p>
             <a:fld id="{91353608-A776-6549-A742-07A412CA6493}" type="datetimeFigureOut">
               <a:rPr lang="en-US" smtClean="0"/>
-              <a:t>2/7/24</a:t>
+              <a:t>2/9/24</a:t>
             </a:fld>
             <a:endParaRPr lang="en-US"/>
           </a:p>
@@ -1002,7 +1268,7 @@
           <a:p>
             <a:fld id="{91353608-A776-6549-A742-07A412CA6493}" type="datetimeFigureOut">
               <a:rPr lang="en-US" smtClean="0"/>
-              <a:t>2/7/24</a:t>
+              <a:t>2/9/24</a:t>
             </a:fld>
             <a:endParaRPr lang="en-US"/>
           </a:p>
@@ -1234,7 +1500,7 @@
           <a:p>
             <a:fld id="{91353608-A776-6549-A742-07A412CA6493}" type="datetimeFigureOut">
               <a:rPr lang="en-US" smtClean="0"/>
-              <a:t>2/7/24</a:t>
+              <a:t>2/9/24</a:t>
             </a:fld>
             <a:endParaRPr lang="en-US"/>
           </a:p>
@@ -1601,7 +1867,7 @@
           <a:p>
             <a:fld id="{91353608-A776-6549-A742-07A412CA6493}" type="datetimeFigureOut">
               <a:rPr lang="en-US" smtClean="0"/>
-              <a:t>2/7/24</a:t>
+              <a:t>2/9/24</a:t>
             </a:fld>
             <a:endParaRPr lang="en-US"/>
           </a:p>
@@ -1719,7 +1985,7 @@
           <a:p>
             <a:fld id="{91353608-A776-6549-A742-07A412CA6493}" type="datetimeFigureOut">
               <a:rPr lang="en-US" smtClean="0"/>
-              <a:t>2/7/24</a:t>
+              <a:t>2/9/24</a:t>
             </a:fld>
             <a:endParaRPr lang="en-US"/>
           </a:p>
@@ -1814,7 +2080,7 @@
           <a:p>
             <a:fld id="{91353608-A776-6549-A742-07A412CA6493}" type="datetimeFigureOut">
               <a:rPr lang="en-US" smtClean="0"/>
-              <a:t>2/7/24</a:t>
+              <a:t>2/9/24</a:t>
             </a:fld>
             <a:endParaRPr lang="en-US"/>
           </a:p>
@@ -2091,7 +2357,7 @@
           <a:p>
             <a:fld id="{91353608-A776-6549-A742-07A412CA6493}" type="datetimeFigureOut">
               <a:rPr lang="en-US" smtClean="0"/>
-              <a:t>2/7/24</a:t>
+              <a:t>2/9/24</a:t>
             </a:fld>
             <a:endParaRPr lang="en-US"/>
           </a:p>
@@ -2348,7 +2614,7 @@
           <a:p>
             <a:fld id="{91353608-A776-6549-A742-07A412CA6493}" type="datetimeFigureOut">
               <a:rPr lang="en-US" smtClean="0"/>
-              <a:t>2/7/24</a:t>
+              <a:t>2/9/24</a:t>
             </a:fld>
             <a:endParaRPr lang="en-US"/>
           </a:p>
@@ -2561,7 +2827,7 @@
           <a:p>
             <a:fld id="{91353608-A776-6549-A742-07A412CA6493}" type="datetimeFigureOut">
               <a:rPr lang="en-US" smtClean="0"/>
-              <a:t>2/7/24</a:t>
+              <a:t>2/9/24</a:t>
             </a:fld>
             <a:endParaRPr lang="en-US"/>
           </a:p>
@@ -2980,8 +3246,8 @@
         </p:nvSpPr>
         <p:spPr>
           <a:xfrm>
-            <a:off x="273108" y="427588"/>
-            <a:ext cx="1535813" cy="586203"/>
+            <a:off x="3504326" y="507303"/>
+            <a:ext cx="1535813" cy="435073"/>
           </a:xfrm>
           <a:prstGeom prst="rect">
             <a:avLst/>
@@ -3049,8 +3315,8 @@
         </p:nvSpPr>
         <p:spPr>
           <a:xfrm>
-            <a:off x="273107" y="1170965"/>
-            <a:ext cx="1535813" cy="586203"/>
+            <a:off x="3504326" y="1051647"/>
+            <a:ext cx="1535813" cy="435073"/>
           </a:xfrm>
           <a:prstGeom prst="rect">
             <a:avLst/>
@@ -3106,7 +3372,7 @@
       </p:sp>
       <p:sp>
         <p:nvSpPr>
-          <p:cNvPr id="7" name="Rectangle 6">
+          <p:cNvPr id="7" name="Parallelogram 6">
             <a:extLst>
               <a:ext uri="{FF2B5EF4-FFF2-40B4-BE49-F238E27FC236}">
                 <a16:creationId xmlns:a16="http://schemas.microsoft.com/office/drawing/2014/main" id="{CA17ACF7-A008-2E15-15A4-695D88F22143}"/>
@@ -3118,8 +3384,71 @@
         </p:nvSpPr>
         <p:spPr>
           <a:xfrm>
-            <a:off x="2104196" y="502324"/>
-            <a:ext cx="747624" cy="436729"/>
+            <a:off x="5264843" y="504079"/>
+            <a:ext cx="966632" cy="436729"/>
+          </a:xfrm>
+          <a:prstGeom prst="parallelogram">
+            <a:avLst/>
+          </a:prstGeom>
+          <a:solidFill>
+            <a:schemeClr val="bg1">
+              <a:lumMod val="95000"/>
+            </a:schemeClr>
+          </a:solidFill>
+          <a:ln>
+            <a:prstDash val="sysDot"/>
+          </a:ln>
+        </p:spPr>
+        <p:style>
+          <a:lnRef idx="2">
+            <a:schemeClr val="dk1">
+              <a:shade val="15000"/>
+            </a:schemeClr>
+          </a:lnRef>
+          <a:fillRef idx="1">
+            <a:schemeClr val="dk1"/>
+          </a:fillRef>
+          <a:effectRef idx="0">
+            <a:schemeClr val="dk1"/>
+          </a:effectRef>
+          <a:fontRef idx="minor">
+            <a:schemeClr val="lt1"/>
+          </a:fontRef>
+        </p:style>
+        <p:txBody>
+          <a:bodyPr rtlCol="0" anchor="ctr"/>
+          <a:lstStyle/>
+          <a:p>
+            <a:pPr algn="ctr"/>
+            <a:r>
+              <a:rPr lang="en-US" sz="1200" dirty="0">
+                <a:solidFill>
+                  <a:sysClr val="windowText" lastClr="000000"/>
+                </a:solidFill>
+                <a:latin typeface="Times New Roman" panose="02020603050405020304" pitchFamily="18" charset="0"/>
+                <a:cs typeface="Times New Roman" panose="02020603050405020304" pitchFamily="18" charset="0"/>
+              </a:rPr>
+              <a:t>GLCM Texture</a:t>
+            </a:r>
+          </a:p>
+        </p:txBody>
+      </p:sp>
+      <p:sp>
+        <p:nvSpPr>
+          <p:cNvPr id="10" name="Rectangle 9">
+            <a:extLst>
+              <a:ext uri="{FF2B5EF4-FFF2-40B4-BE49-F238E27FC236}">
+                <a16:creationId xmlns:a16="http://schemas.microsoft.com/office/drawing/2014/main" id="{A27C95AC-463C-7048-A0B9-7A9B2DD99C98}"/>
+              </a:ext>
+            </a:extLst>
+          </p:cNvPr>
+          <p:cNvSpPr/>
+          <p:nvPr/>
+        </p:nvSpPr>
+        <p:spPr>
+          <a:xfrm>
+            <a:off x="5399454" y="1049990"/>
+            <a:ext cx="747625" cy="436730"/>
           </a:xfrm>
           <a:prstGeom prst="rect">
             <a:avLst/>
@@ -3162,17 +3491,17 @@
                 <a:latin typeface="Times New Roman" panose="02020603050405020304" pitchFamily="18" charset="0"/>
                 <a:cs typeface="Times New Roman" panose="02020603050405020304" pitchFamily="18" charset="0"/>
               </a:rPr>
-              <a:t>GLCM Texture</a:t>
-            </a:r>
-          </a:p>
-        </p:txBody>
-      </p:sp>
-      <p:sp>
-        <p:nvSpPr>
-          <p:cNvPr id="10" name="Rectangle 9">
+              <a:t>Spectral Indices</a:t>
+            </a:r>
+          </a:p>
+        </p:txBody>
+      </p:sp>
+      <p:sp>
+        <p:nvSpPr>
+          <p:cNvPr id="11" name="Rectangle 10">
             <a:extLst>
               <a:ext uri="{FF2B5EF4-FFF2-40B4-BE49-F238E27FC236}">
-                <a16:creationId xmlns:a16="http://schemas.microsoft.com/office/drawing/2014/main" id="{A27C95AC-463C-7048-A0B9-7A9B2DD99C98}"/>
+                <a16:creationId xmlns:a16="http://schemas.microsoft.com/office/drawing/2014/main" id="{817978DE-4116-3E68-44C2-73CDBFAC024D}"/>
               </a:ext>
             </a:extLst>
           </p:cNvPr>
@@ -3181,7 +3510,101 @@
         </p:nvSpPr>
         <p:spPr>
           <a:xfrm>
-            <a:off x="2104196" y="1231574"/>
+            <a:off x="3504326" y="1605716"/>
+            <a:ext cx="1535813" cy="435074"/>
+          </a:xfrm>
+          <a:prstGeom prst="rect">
+            <a:avLst/>
+          </a:prstGeom>
+          <a:ln>
+            <a:prstDash val="sysDot"/>
+          </a:ln>
+        </p:spPr>
+        <p:style>
+          <a:lnRef idx="2">
+            <a:schemeClr val="dk1"/>
+          </a:lnRef>
+          <a:fillRef idx="1">
+            <a:schemeClr val="lt1"/>
+          </a:fillRef>
+          <a:effectRef idx="0">
+            <a:schemeClr val="dk1"/>
+          </a:effectRef>
+          <a:fontRef idx="minor">
+            <a:schemeClr val="dk1"/>
+          </a:fontRef>
+        </p:style>
+        <p:txBody>
+          <a:bodyPr rtlCol="0" anchor="ctr"/>
+          <a:lstStyle/>
+          <a:p>
+            <a:pPr algn="ctr"/>
+            <a:r>
+              <a:rPr lang="en-US" sz="1200" dirty="0">
+                <a:solidFill>
+                  <a:sysClr val="windowText" lastClr="000000"/>
+                </a:solidFill>
+                <a:latin typeface="Times New Roman" panose="02020603050405020304" pitchFamily="18" charset="0"/>
+                <a:cs typeface="Times New Roman" panose="02020603050405020304" pitchFamily="18" charset="0"/>
+              </a:rPr>
+              <a:t>Topographic Data (Elevation)</a:t>
+            </a:r>
+          </a:p>
+        </p:txBody>
+      </p:sp>
+      <p:sp>
+        <p:nvSpPr>
+          <p:cNvPr id="12" name="TextBox 11">
+            <a:extLst>
+              <a:ext uri="{FF2B5EF4-FFF2-40B4-BE49-F238E27FC236}">
+                <a16:creationId xmlns:a16="http://schemas.microsoft.com/office/drawing/2014/main" id="{F9E3C43F-91F8-3834-A7F7-701EBC21FC9A}"/>
+              </a:ext>
+            </a:extLst>
+          </p:cNvPr>
+          <p:cNvSpPr txBox="1"/>
+          <p:nvPr/>
+        </p:nvSpPr>
+        <p:spPr>
+          <a:xfrm>
+            <a:off x="3504326" y="132221"/>
+            <a:ext cx="2672526" cy="276999"/>
+          </a:xfrm>
+          <a:prstGeom prst="rect">
+            <a:avLst/>
+          </a:prstGeom>
+          <a:noFill/>
+        </p:spPr>
+        <p:txBody>
+          <a:bodyPr wrap="none" rtlCol="0">
+            <a:spAutoFit/>
+          </a:bodyPr>
+          <a:lstStyle/>
+          <a:p>
+            <a:r>
+              <a:rPr lang="en-US" sz="1200" u="sng" dirty="0">
+                <a:latin typeface="Times New Roman" panose="02020603050405020304" pitchFamily="18" charset="0"/>
+                <a:cs typeface="Times New Roman" panose="02020603050405020304" pitchFamily="18" charset="0"/>
+              </a:rPr>
+              <a:t>Satellite Data Collection and Processing</a:t>
+            </a:r>
+          </a:p>
+        </p:txBody>
+      </p:sp>
+      <p:sp>
+        <p:nvSpPr>
+          <p:cNvPr id="15" name="Rectangle 14">
+            <a:extLst>
+              <a:ext uri="{FF2B5EF4-FFF2-40B4-BE49-F238E27FC236}">
+                <a16:creationId xmlns:a16="http://schemas.microsoft.com/office/drawing/2014/main" id="{53A601F6-653C-07AC-0270-0ADDEF631D4C}"/>
+              </a:ext>
+            </a:extLst>
+          </p:cNvPr>
+          <p:cNvSpPr/>
+          <p:nvPr/>
+        </p:nvSpPr>
+        <p:spPr>
+          <a:xfrm>
+            <a:off x="5399454" y="1604888"/>
             <a:ext cx="747625" cy="436730"/>
           </a:xfrm>
           <a:prstGeom prst="rect">
@@ -3225,163 +3648,6 @@
                 <a:latin typeface="Times New Roman" panose="02020603050405020304" pitchFamily="18" charset="0"/>
                 <a:cs typeface="Times New Roman" panose="02020603050405020304" pitchFamily="18" charset="0"/>
               </a:rPr>
-              <a:t>Spectral Indices</a:t>
-            </a:r>
-          </a:p>
-        </p:txBody>
-      </p:sp>
-      <p:sp>
-        <p:nvSpPr>
-          <p:cNvPr id="11" name="Rectangle 10">
-            <a:extLst>
-              <a:ext uri="{FF2B5EF4-FFF2-40B4-BE49-F238E27FC236}">
-                <a16:creationId xmlns:a16="http://schemas.microsoft.com/office/drawing/2014/main" id="{817978DE-4116-3E68-44C2-73CDBFAC024D}"/>
-              </a:ext>
-            </a:extLst>
-          </p:cNvPr>
-          <p:cNvSpPr/>
-          <p:nvPr/>
-        </p:nvSpPr>
-        <p:spPr>
-          <a:xfrm>
-            <a:off x="273107" y="1914342"/>
-            <a:ext cx="1535813" cy="586203"/>
-          </a:xfrm>
-          <a:prstGeom prst="rect">
-            <a:avLst/>
-          </a:prstGeom>
-          <a:ln>
-            <a:prstDash val="sysDot"/>
-          </a:ln>
-        </p:spPr>
-        <p:style>
-          <a:lnRef idx="2">
-            <a:schemeClr val="dk1"/>
-          </a:lnRef>
-          <a:fillRef idx="1">
-            <a:schemeClr val="lt1"/>
-          </a:fillRef>
-          <a:effectRef idx="0">
-            <a:schemeClr val="dk1"/>
-          </a:effectRef>
-          <a:fontRef idx="minor">
-            <a:schemeClr val="dk1"/>
-          </a:fontRef>
-        </p:style>
-        <p:txBody>
-          <a:bodyPr rtlCol="0" anchor="ctr"/>
-          <a:lstStyle/>
-          <a:p>
-            <a:pPr algn="ctr"/>
-            <a:r>
-              <a:rPr lang="en-US" sz="1200" dirty="0">
-                <a:solidFill>
-                  <a:sysClr val="windowText" lastClr="000000"/>
-                </a:solidFill>
-                <a:latin typeface="Times New Roman" panose="02020603050405020304" pitchFamily="18" charset="0"/>
-                <a:cs typeface="Times New Roman" panose="02020603050405020304" pitchFamily="18" charset="0"/>
-              </a:rPr>
-              <a:t>Topographic Data (Elevation)</a:t>
-            </a:r>
-          </a:p>
-        </p:txBody>
-      </p:sp>
-      <p:sp>
-        <p:nvSpPr>
-          <p:cNvPr id="12" name="TextBox 11">
-            <a:extLst>
-              <a:ext uri="{FF2B5EF4-FFF2-40B4-BE49-F238E27FC236}">
-                <a16:creationId xmlns:a16="http://schemas.microsoft.com/office/drawing/2014/main" id="{F9E3C43F-91F8-3834-A7F7-701EBC21FC9A}"/>
-              </a:ext>
-            </a:extLst>
-          </p:cNvPr>
-          <p:cNvSpPr txBox="1"/>
-          <p:nvPr/>
-        </p:nvSpPr>
-        <p:spPr>
-          <a:xfrm>
-            <a:off x="273108" y="107662"/>
-            <a:ext cx="2672526" cy="276999"/>
-          </a:xfrm>
-          <a:prstGeom prst="rect">
-            <a:avLst/>
-          </a:prstGeom>
-          <a:noFill/>
-        </p:spPr>
-        <p:txBody>
-          <a:bodyPr wrap="none" rtlCol="0">
-            <a:spAutoFit/>
-          </a:bodyPr>
-          <a:lstStyle/>
-          <a:p>
-            <a:r>
-              <a:rPr lang="en-US" sz="1200" u="sng" dirty="0">
-                <a:latin typeface="Times New Roman" panose="02020603050405020304" pitchFamily="18" charset="0"/>
-                <a:cs typeface="Times New Roman" panose="02020603050405020304" pitchFamily="18" charset="0"/>
-              </a:rPr>
-              <a:t>Satellite Data Collection and Processing</a:t>
-            </a:r>
-          </a:p>
-        </p:txBody>
-      </p:sp>
-      <p:sp>
-        <p:nvSpPr>
-          <p:cNvPr id="15" name="Rectangle 14">
-            <a:extLst>
-              <a:ext uri="{FF2B5EF4-FFF2-40B4-BE49-F238E27FC236}">
-                <a16:creationId xmlns:a16="http://schemas.microsoft.com/office/drawing/2014/main" id="{53A601F6-653C-07AC-0270-0ADDEF631D4C}"/>
-              </a:ext>
-            </a:extLst>
-          </p:cNvPr>
-          <p:cNvSpPr/>
-          <p:nvPr/>
-        </p:nvSpPr>
-        <p:spPr>
-          <a:xfrm>
-            <a:off x="2104195" y="1977793"/>
-            <a:ext cx="747625" cy="436730"/>
-          </a:xfrm>
-          <a:prstGeom prst="rect">
-            <a:avLst/>
-          </a:prstGeom>
-          <a:solidFill>
-            <a:schemeClr val="bg1">
-              <a:lumMod val="95000"/>
-            </a:schemeClr>
-          </a:solidFill>
-          <a:ln>
-            <a:prstDash val="sysDot"/>
-          </a:ln>
-        </p:spPr>
-        <p:style>
-          <a:lnRef idx="2">
-            <a:schemeClr val="dk1">
-              <a:shade val="15000"/>
-            </a:schemeClr>
-          </a:lnRef>
-          <a:fillRef idx="1">
-            <a:schemeClr val="dk1"/>
-          </a:fillRef>
-          <a:effectRef idx="0">
-            <a:schemeClr val="dk1"/>
-          </a:effectRef>
-          <a:fontRef idx="minor">
-            <a:schemeClr val="lt1"/>
-          </a:fontRef>
-        </p:style>
-        <p:txBody>
-          <a:bodyPr rtlCol="0" anchor="ctr"/>
-          <a:lstStyle/>
-          <a:p>
-            <a:pPr algn="ctr"/>
-            <a:r>
-              <a:rPr lang="en-US" sz="1200" dirty="0">
-                <a:solidFill>
-                  <a:sysClr val="windowText" lastClr="000000"/>
-                </a:solidFill>
-                <a:latin typeface="Times New Roman" panose="02020603050405020304" pitchFamily="18" charset="0"/>
-                <a:cs typeface="Times New Roman" panose="02020603050405020304" pitchFamily="18" charset="0"/>
-              </a:rPr>
               <a:t>Slope, Aspect</a:t>
             </a:r>
           </a:p>
@@ -3401,7 +3667,7 @@
         </p:nvSpPr>
         <p:spPr>
           <a:xfrm>
-            <a:off x="3012745" y="3568251"/>
+            <a:off x="2705841" y="2759653"/>
             <a:ext cx="1141440" cy="800490"/>
           </a:xfrm>
           <a:prstGeom prst="hexagon">
@@ -3440,7 +3706,7 @@
                 <a:latin typeface="Times New Roman" panose="02020603050405020304" pitchFamily="18" charset="0"/>
                 <a:cs typeface="Times New Roman" panose="02020603050405020304" pitchFamily="18" charset="0"/>
               </a:rPr>
-              <a:t>Sampled Reference Data</a:t>
+              <a:t>Sampled Learning Data</a:t>
             </a:r>
           </a:p>
         </p:txBody>
@@ -3459,8 +3725,8 @@
         </p:nvSpPr>
         <p:spPr>
           <a:xfrm>
-            <a:off x="1041014" y="4355821"/>
-            <a:ext cx="1213089" cy="276999"/>
+            <a:off x="1778476" y="2356423"/>
+            <a:ext cx="3096425" cy="276999"/>
           </a:xfrm>
           <a:prstGeom prst="rect">
             <a:avLst/>
@@ -3474,11 +3740,11 @@
           <a:lstStyle/>
           <a:p>
             <a:r>
-              <a:rPr lang="en-US" sz="1200" dirty="0">
+              <a:rPr lang="en-US" sz="1200" u="sng" dirty="0">
                 <a:latin typeface="Times New Roman" panose="02020603050405020304" pitchFamily="18" charset="0"/>
                 <a:cs typeface="Times New Roman" panose="02020603050405020304" pitchFamily="18" charset="0"/>
               </a:rPr>
-              <a:t>Scenario Testing</a:t>
+              <a:t>Model Development and Accuracy Assessment</a:t>
             </a:r>
           </a:p>
         </p:txBody>
@@ -3497,8 +3763,8 @@
         </p:nvSpPr>
         <p:spPr>
           <a:xfrm>
-            <a:off x="4919728" y="819284"/>
-            <a:ext cx="1302392" cy="389013"/>
+            <a:off x="2088977" y="643880"/>
+            <a:ext cx="938812" cy="389013"/>
           </a:xfrm>
           <a:prstGeom prst="rect">
             <a:avLst/>
@@ -3553,8 +3819,8 @@
         </p:nvSpPr>
         <p:spPr>
           <a:xfrm>
-            <a:off x="4919728" y="1757168"/>
-            <a:ext cx="1302392" cy="389013"/>
+            <a:off x="2088977" y="1595500"/>
+            <a:ext cx="938812" cy="389013"/>
           </a:xfrm>
           <a:prstGeom prst="rect">
             <a:avLst/>
@@ -3609,8 +3875,8 @@
         </p:nvSpPr>
         <p:spPr>
           <a:xfrm>
-            <a:off x="3583465" y="538909"/>
-            <a:ext cx="747624" cy="436729"/>
+            <a:off x="315186" y="543888"/>
+            <a:ext cx="1233711" cy="294499"/>
           </a:xfrm>
           <a:prstGeom prst="rect">
             <a:avLst/>
@@ -3672,7 +3938,7 @@
         </p:nvSpPr>
         <p:spPr>
           <a:xfrm>
-            <a:off x="3528624" y="1733309"/>
+            <a:off x="315186" y="1578876"/>
             <a:ext cx="1233712" cy="436729"/>
           </a:xfrm>
           <a:prstGeom prst="rect">
@@ -3735,8 +4001,8 @@
         </p:nvSpPr>
         <p:spPr>
           <a:xfrm>
-            <a:off x="5129997" y="3886200"/>
-            <a:ext cx="1166070" cy="746620"/>
+            <a:off x="3483867" y="2813523"/>
+            <a:ext cx="873726" cy="746620"/>
           </a:xfrm>
           <a:prstGeom prst="snip2DiagRect">
             <a:avLst/>
@@ -3793,7 +4059,7 @@
         </p:nvSpPr>
         <p:spPr>
           <a:xfrm>
-            <a:off x="3583465" y="107662"/>
+            <a:off x="315187" y="112641"/>
             <a:ext cx="2712602" cy="276999"/>
           </a:xfrm>
           <a:prstGeom prst="rect">
@@ -3808,7 +4074,7 @@
           <a:lstStyle/>
           <a:p>
             <a:r>
-              <a:rPr lang="en-US" sz="1200" dirty="0">
+              <a:rPr lang="en-US" sz="1200" u="sng" dirty="0">
                 <a:latin typeface="Times New Roman" panose="02020603050405020304" pitchFamily="18" charset="0"/>
                 <a:cs typeface="Times New Roman" panose="02020603050405020304" pitchFamily="18" charset="0"/>
               </a:rPr>
@@ -3831,8 +4097,8 @@
         </p:nvSpPr>
         <p:spPr>
           <a:xfrm>
-            <a:off x="153584" y="107662"/>
-            <a:ext cx="3011648" cy="2560037"/>
+            <a:off x="3384802" y="112642"/>
+            <a:ext cx="2980197" cy="2073210"/>
           </a:xfrm>
           <a:prstGeom prst="rect">
             <a:avLst/>
@@ -3883,8 +4149,8 @@
         </p:nvSpPr>
         <p:spPr>
           <a:xfrm>
-            <a:off x="3583465" y="1027337"/>
-            <a:ext cx="747624" cy="436729"/>
+            <a:off x="315186" y="921520"/>
+            <a:ext cx="1233712" cy="389013"/>
           </a:xfrm>
           <a:prstGeom prst="rect">
             <a:avLst/>
@@ -3927,7 +4193,529 @@
                 <a:latin typeface="Times New Roman" panose="02020603050405020304" pitchFamily="18" charset="0"/>
                 <a:cs typeface="Times New Roman" panose="02020603050405020304" pitchFamily="18" charset="0"/>
               </a:rPr>
-              <a:t>USFS TreeMap</a:t>
+              <a:t>USFS TreeMap Aspen Mask</a:t>
+            </a:r>
+          </a:p>
+        </p:txBody>
+      </p:sp>
+      <p:cxnSp>
+        <p:nvCxnSpPr>
+          <p:cNvPr id="3" name="Straight Connector 2">
+            <a:extLst>
+              <a:ext uri="{FF2B5EF4-FFF2-40B4-BE49-F238E27FC236}">
+                <a16:creationId xmlns:a16="http://schemas.microsoft.com/office/drawing/2014/main" id="{3F3BAC37-2094-BBB9-E04F-B3D2DF0F4E1B}"/>
+              </a:ext>
+            </a:extLst>
+          </p:cNvPr>
+          <p:cNvCxnSpPr>
+            <a:cxnSpLocks/>
+            <a:stCxn id="4" idx="3"/>
+            <a:endCxn id="7" idx="5"/>
+          </p:cNvCxnSpPr>
+          <p:nvPr/>
+        </p:nvCxnSpPr>
+        <p:spPr>
+          <a:xfrm flipV="1">
+            <a:off x="5040139" y="722444"/>
+            <a:ext cx="279295" cy="2396"/>
+          </a:xfrm>
+          <a:prstGeom prst="line">
+            <a:avLst/>
+          </a:prstGeom>
+          <a:ln w="12700"/>
+        </p:spPr>
+        <p:style>
+          <a:lnRef idx="1">
+            <a:schemeClr val="dk1"/>
+          </a:lnRef>
+          <a:fillRef idx="0">
+            <a:schemeClr val="dk1"/>
+          </a:fillRef>
+          <a:effectRef idx="0">
+            <a:schemeClr val="dk1"/>
+          </a:effectRef>
+          <a:fontRef idx="minor">
+            <a:schemeClr val="tx1"/>
+          </a:fontRef>
+        </p:style>
+      </p:cxnSp>
+      <p:cxnSp>
+        <p:nvCxnSpPr>
+          <p:cNvPr id="8" name="Straight Connector 7">
+            <a:extLst>
+              <a:ext uri="{FF2B5EF4-FFF2-40B4-BE49-F238E27FC236}">
+                <a16:creationId xmlns:a16="http://schemas.microsoft.com/office/drawing/2014/main" id="{263E2082-D57A-5C05-3646-F7F5F4D90CF4}"/>
+              </a:ext>
+            </a:extLst>
+          </p:cNvPr>
+          <p:cNvCxnSpPr>
+            <a:cxnSpLocks/>
+            <a:stCxn id="5" idx="3"/>
+            <a:endCxn id="10" idx="1"/>
+          </p:cNvCxnSpPr>
+          <p:nvPr/>
+        </p:nvCxnSpPr>
+        <p:spPr>
+          <a:xfrm flipV="1">
+            <a:off x="5040139" y="1268355"/>
+            <a:ext cx="359315" cy="829"/>
+          </a:xfrm>
+          <a:prstGeom prst="line">
+            <a:avLst/>
+          </a:prstGeom>
+          <a:ln w="12700"/>
+        </p:spPr>
+        <p:style>
+          <a:lnRef idx="1">
+            <a:schemeClr val="dk1"/>
+          </a:lnRef>
+          <a:fillRef idx="0">
+            <a:schemeClr val="dk1"/>
+          </a:fillRef>
+          <a:effectRef idx="0">
+            <a:schemeClr val="dk1"/>
+          </a:effectRef>
+          <a:fontRef idx="minor">
+            <a:schemeClr val="tx1"/>
+          </a:fontRef>
+        </p:style>
+      </p:cxnSp>
+      <p:cxnSp>
+        <p:nvCxnSpPr>
+          <p:cNvPr id="9" name="Straight Connector 8">
+            <a:extLst>
+              <a:ext uri="{FF2B5EF4-FFF2-40B4-BE49-F238E27FC236}">
+                <a16:creationId xmlns:a16="http://schemas.microsoft.com/office/drawing/2014/main" id="{8DEE4B27-DE7C-5D52-C955-5ADEE721A328}"/>
+              </a:ext>
+            </a:extLst>
+          </p:cNvPr>
+          <p:cNvCxnSpPr>
+            <a:cxnSpLocks/>
+            <a:stCxn id="11" idx="3"/>
+            <a:endCxn id="15" idx="1"/>
+          </p:cNvCxnSpPr>
+          <p:nvPr/>
+        </p:nvCxnSpPr>
+        <p:spPr>
+          <a:xfrm>
+            <a:off x="5040139" y="1823253"/>
+            <a:ext cx="359315" cy="0"/>
+          </a:xfrm>
+          <a:prstGeom prst="line">
+            <a:avLst/>
+          </a:prstGeom>
+          <a:ln w="12700"/>
+        </p:spPr>
+        <p:style>
+          <a:lnRef idx="1">
+            <a:schemeClr val="dk1"/>
+          </a:lnRef>
+          <a:fillRef idx="0">
+            <a:schemeClr val="dk1"/>
+          </a:fillRef>
+          <a:effectRef idx="0">
+            <a:schemeClr val="dk1"/>
+          </a:effectRef>
+          <a:fontRef idx="minor">
+            <a:schemeClr val="tx1"/>
+          </a:fontRef>
+        </p:style>
+      </p:cxnSp>
+      <p:cxnSp>
+        <p:nvCxnSpPr>
+          <p:cNvPr id="37" name="Straight Connector 36">
+            <a:extLst>
+              <a:ext uri="{FF2B5EF4-FFF2-40B4-BE49-F238E27FC236}">
+                <a16:creationId xmlns:a16="http://schemas.microsoft.com/office/drawing/2014/main" id="{A4624795-A35A-64AF-D646-358DE5218539}"/>
+              </a:ext>
+            </a:extLst>
+          </p:cNvPr>
+          <p:cNvCxnSpPr>
+            <a:cxnSpLocks/>
+            <a:stCxn id="20" idx="3"/>
+            <a:endCxn id="18" idx="1"/>
+          </p:cNvCxnSpPr>
+          <p:nvPr/>
+        </p:nvCxnSpPr>
+        <p:spPr>
+          <a:xfrm>
+            <a:off x="1548897" y="691138"/>
+            <a:ext cx="540080" cy="147249"/>
+          </a:xfrm>
+          <a:prstGeom prst="line">
+            <a:avLst/>
+          </a:prstGeom>
+          <a:ln w="12700"/>
+        </p:spPr>
+        <p:style>
+          <a:lnRef idx="1">
+            <a:schemeClr val="dk1"/>
+          </a:lnRef>
+          <a:fillRef idx="0">
+            <a:schemeClr val="dk1"/>
+          </a:fillRef>
+          <a:effectRef idx="0">
+            <a:schemeClr val="dk1"/>
+          </a:effectRef>
+          <a:fontRef idx="minor">
+            <a:schemeClr val="tx1"/>
+          </a:fontRef>
+        </p:style>
+      </p:cxnSp>
+      <p:cxnSp>
+        <p:nvCxnSpPr>
+          <p:cNvPr id="38" name="Straight Connector 37">
+            <a:extLst>
+              <a:ext uri="{FF2B5EF4-FFF2-40B4-BE49-F238E27FC236}">
+                <a16:creationId xmlns:a16="http://schemas.microsoft.com/office/drawing/2014/main" id="{8AD4F4AD-107B-E967-26FE-0E945C9212E1}"/>
+              </a:ext>
+            </a:extLst>
+          </p:cNvPr>
+          <p:cNvCxnSpPr>
+            <a:cxnSpLocks/>
+            <a:stCxn id="25" idx="3"/>
+            <a:endCxn id="18" idx="1"/>
+          </p:cNvCxnSpPr>
+          <p:nvPr/>
+        </p:nvCxnSpPr>
+        <p:spPr>
+          <a:xfrm flipV="1">
+            <a:off x="1548898" y="838387"/>
+            <a:ext cx="540079" cy="277640"/>
+          </a:xfrm>
+          <a:prstGeom prst="line">
+            <a:avLst/>
+          </a:prstGeom>
+          <a:ln w="12700"/>
+        </p:spPr>
+        <p:style>
+          <a:lnRef idx="1">
+            <a:schemeClr val="dk1"/>
+          </a:lnRef>
+          <a:fillRef idx="0">
+            <a:schemeClr val="dk1"/>
+          </a:fillRef>
+          <a:effectRef idx="0">
+            <a:schemeClr val="dk1"/>
+          </a:effectRef>
+          <a:fontRef idx="minor">
+            <a:schemeClr val="tx1"/>
+          </a:fontRef>
+        </p:style>
+      </p:cxnSp>
+      <p:cxnSp>
+        <p:nvCxnSpPr>
+          <p:cNvPr id="43" name="Straight Connector 42">
+            <a:extLst>
+              <a:ext uri="{FF2B5EF4-FFF2-40B4-BE49-F238E27FC236}">
+                <a16:creationId xmlns:a16="http://schemas.microsoft.com/office/drawing/2014/main" id="{CAE9E58C-5992-6DBA-2374-C1F90D18897A}"/>
+              </a:ext>
+            </a:extLst>
+          </p:cNvPr>
+          <p:cNvCxnSpPr>
+            <a:cxnSpLocks/>
+            <a:stCxn id="19" idx="0"/>
+            <a:endCxn id="18" idx="2"/>
+          </p:cNvCxnSpPr>
+          <p:nvPr/>
+        </p:nvCxnSpPr>
+        <p:spPr>
+          <a:xfrm flipV="1">
+            <a:off x="2558383" y="1032893"/>
+            <a:ext cx="0" cy="562607"/>
+          </a:xfrm>
+          <a:prstGeom prst="line">
+            <a:avLst/>
+          </a:prstGeom>
+          <a:ln w="12700"/>
+        </p:spPr>
+        <p:style>
+          <a:lnRef idx="1">
+            <a:schemeClr val="dk1"/>
+          </a:lnRef>
+          <a:fillRef idx="0">
+            <a:schemeClr val="dk1"/>
+          </a:fillRef>
+          <a:effectRef idx="0">
+            <a:schemeClr val="dk1"/>
+          </a:effectRef>
+          <a:fontRef idx="minor">
+            <a:schemeClr val="tx1"/>
+          </a:fontRef>
+        </p:style>
+      </p:cxnSp>
+      <p:cxnSp>
+        <p:nvCxnSpPr>
+          <p:cNvPr id="47" name="Straight Connector 46">
+            <a:extLst>
+              <a:ext uri="{FF2B5EF4-FFF2-40B4-BE49-F238E27FC236}">
+                <a16:creationId xmlns:a16="http://schemas.microsoft.com/office/drawing/2014/main" id="{A90A21E9-D198-9A68-E578-24BF7FF4743A}"/>
+              </a:ext>
+            </a:extLst>
+          </p:cNvPr>
+          <p:cNvCxnSpPr>
+            <a:cxnSpLocks/>
+            <a:stCxn id="16" idx="5"/>
+            <a:endCxn id="19" idx="2"/>
+          </p:cNvCxnSpPr>
+          <p:nvPr/>
+        </p:nvCxnSpPr>
+        <p:spPr>
+          <a:xfrm flipH="1" flipV="1">
+            <a:off x="2558383" y="1984513"/>
+            <a:ext cx="1088776" cy="775140"/>
+          </a:xfrm>
+          <a:prstGeom prst="line">
+            <a:avLst/>
+          </a:prstGeom>
+          <a:ln w="12700"/>
+        </p:spPr>
+        <p:style>
+          <a:lnRef idx="1">
+            <a:schemeClr val="dk1"/>
+          </a:lnRef>
+          <a:fillRef idx="0">
+            <a:schemeClr val="dk1"/>
+          </a:fillRef>
+          <a:effectRef idx="0">
+            <a:schemeClr val="dk1"/>
+          </a:effectRef>
+          <a:fontRef idx="minor">
+            <a:schemeClr val="tx1"/>
+          </a:fontRef>
+        </p:style>
+      </p:cxnSp>
+      <p:sp>
+        <p:nvSpPr>
+          <p:cNvPr id="59" name="Rectangle 58">
+            <a:extLst>
+              <a:ext uri="{FF2B5EF4-FFF2-40B4-BE49-F238E27FC236}">
+                <a16:creationId xmlns:a16="http://schemas.microsoft.com/office/drawing/2014/main" id="{50D8BCC4-1743-E752-4A40-DDE8A6F05112}"/>
+              </a:ext>
+            </a:extLst>
+          </p:cNvPr>
+          <p:cNvSpPr/>
+          <p:nvPr/>
+        </p:nvSpPr>
+        <p:spPr>
+          <a:xfrm>
+            <a:off x="152325" y="112642"/>
+            <a:ext cx="2980197" cy="2073210"/>
+          </a:xfrm>
+          <a:prstGeom prst="rect">
+            <a:avLst/>
+          </a:prstGeom>
+          <a:noFill/>
+          <a:ln>
+            <a:solidFill>
+              <a:schemeClr val="tx1"/>
+            </a:solidFill>
+          </a:ln>
+        </p:spPr>
+        <p:style>
+          <a:lnRef idx="2">
+            <a:schemeClr val="accent1">
+              <a:shade val="15000"/>
+            </a:schemeClr>
+          </a:lnRef>
+          <a:fillRef idx="1">
+            <a:schemeClr val="accent1"/>
+          </a:fillRef>
+          <a:effectRef idx="0">
+            <a:schemeClr val="accent1"/>
+          </a:effectRef>
+          <a:fontRef idx="minor">
+            <a:schemeClr val="lt1"/>
+          </a:fontRef>
+        </p:style>
+        <p:txBody>
+          <a:bodyPr rtlCol="0" anchor="ctr"/>
+          <a:lstStyle/>
+          <a:p>
+            <a:pPr algn="ctr"/>
+            <a:endParaRPr lang="en-US"/>
+          </a:p>
+        </p:txBody>
+      </p:sp>
+      <p:cxnSp>
+        <p:nvCxnSpPr>
+          <p:cNvPr id="60" name="Straight Connector 59">
+            <a:extLst>
+              <a:ext uri="{FF2B5EF4-FFF2-40B4-BE49-F238E27FC236}">
+                <a16:creationId xmlns:a16="http://schemas.microsoft.com/office/drawing/2014/main" id="{9B84BB9C-6235-7A08-31ED-088F49A67F8F}"/>
+              </a:ext>
+            </a:extLst>
+          </p:cNvPr>
+          <p:cNvCxnSpPr>
+            <a:cxnSpLocks/>
+            <a:stCxn id="21" idx="3"/>
+            <a:endCxn id="19" idx="1"/>
+          </p:cNvCxnSpPr>
+          <p:nvPr/>
+        </p:nvCxnSpPr>
+        <p:spPr>
+          <a:xfrm flipV="1">
+            <a:off x="1548898" y="1790007"/>
+            <a:ext cx="540079" cy="7234"/>
+          </a:xfrm>
+          <a:prstGeom prst="line">
+            <a:avLst/>
+          </a:prstGeom>
+          <a:ln w="12700"/>
+        </p:spPr>
+        <p:style>
+          <a:lnRef idx="1">
+            <a:schemeClr val="dk1"/>
+          </a:lnRef>
+          <a:fillRef idx="0">
+            <a:schemeClr val="dk1"/>
+          </a:fillRef>
+          <a:effectRef idx="0">
+            <a:schemeClr val="dk1"/>
+          </a:effectRef>
+          <a:fontRef idx="minor">
+            <a:schemeClr val="tx1"/>
+          </a:fontRef>
+        </p:style>
+      </p:cxnSp>
+      <p:sp>
+        <p:nvSpPr>
+          <p:cNvPr id="63" name="Rectangle 62">
+            <a:extLst>
+              <a:ext uri="{FF2B5EF4-FFF2-40B4-BE49-F238E27FC236}">
+                <a16:creationId xmlns:a16="http://schemas.microsoft.com/office/drawing/2014/main" id="{C78F6C3A-42A6-2EDA-D7BF-BCF3EEEBE142}"/>
+              </a:ext>
+            </a:extLst>
+          </p:cNvPr>
+          <p:cNvSpPr/>
+          <p:nvPr/>
+        </p:nvSpPr>
+        <p:spPr>
+          <a:xfrm>
+            <a:off x="152326" y="2347774"/>
+            <a:ext cx="6248473" cy="1575640"/>
+          </a:xfrm>
+          <a:prstGeom prst="rect">
+            <a:avLst/>
+          </a:prstGeom>
+          <a:noFill/>
+          <a:ln>
+            <a:solidFill>
+              <a:schemeClr val="tx1"/>
+            </a:solidFill>
+          </a:ln>
+        </p:spPr>
+        <p:style>
+          <a:lnRef idx="2">
+            <a:schemeClr val="accent1">
+              <a:shade val="15000"/>
+            </a:schemeClr>
+          </a:lnRef>
+          <a:fillRef idx="1">
+            <a:schemeClr val="accent1"/>
+          </a:fillRef>
+          <a:effectRef idx="0">
+            <a:schemeClr val="accent1"/>
+          </a:effectRef>
+          <a:fontRef idx="minor">
+            <a:schemeClr val="lt1"/>
+          </a:fontRef>
+        </p:style>
+        <p:txBody>
+          <a:bodyPr rtlCol="0" anchor="ctr"/>
+          <a:lstStyle/>
+          <a:p>
+            <a:pPr algn="ctr"/>
+            <a:endParaRPr lang="en-US"/>
+          </a:p>
+        </p:txBody>
+      </p:sp>
+      <p:sp>
+        <p:nvSpPr>
+          <p:cNvPr id="64" name="Rectangle 63">
+            <a:extLst>
+              <a:ext uri="{FF2B5EF4-FFF2-40B4-BE49-F238E27FC236}">
+                <a16:creationId xmlns:a16="http://schemas.microsoft.com/office/drawing/2014/main" id="{04E8CCE8-4357-3EDD-4E54-C5A7428DA336}"/>
+              </a:ext>
+            </a:extLst>
+          </p:cNvPr>
+          <p:cNvSpPr/>
+          <p:nvPr/>
+        </p:nvSpPr>
+        <p:spPr>
+          <a:xfrm>
+            <a:off x="152325" y="4112164"/>
+            <a:ext cx="6248473" cy="1575640"/>
+          </a:xfrm>
+          <a:prstGeom prst="rect">
+            <a:avLst/>
+          </a:prstGeom>
+          <a:noFill/>
+          <a:ln>
+            <a:solidFill>
+              <a:schemeClr val="tx1"/>
+            </a:solidFill>
+          </a:ln>
+        </p:spPr>
+        <p:style>
+          <a:lnRef idx="2">
+            <a:schemeClr val="accent1">
+              <a:shade val="15000"/>
+            </a:schemeClr>
+          </a:lnRef>
+          <a:fillRef idx="1">
+            <a:schemeClr val="accent1"/>
+          </a:fillRef>
+          <a:effectRef idx="0">
+            <a:schemeClr val="accent1"/>
+          </a:effectRef>
+          <a:fontRef idx="minor">
+            <a:schemeClr val="lt1"/>
+          </a:fontRef>
+        </p:style>
+        <p:txBody>
+          <a:bodyPr rtlCol="0" anchor="ctr"/>
+          <a:lstStyle/>
+          <a:p>
+            <a:pPr algn="ctr"/>
+            <a:endParaRPr lang="en-US"/>
+          </a:p>
+        </p:txBody>
+      </p:sp>
+      <p:sp>
+        <p:nvSpPr>
+          <p:cNvPr id="65" name="TextBox 64">
+            <a:extLst>
+              <a:ext uri="{FF2B5EF4-FFF2-40B4-BE49-F238E27FC236}">
+                <a16:creationId xmlns:a16="http://schemas.microsoft.com/office/drawing/2014/main" id="{C78F2338-0420-B816-58C1-4676F3E5E4D1}"/>
+              </a:ext>
+            </a:extLst>
+          </p:cNvPr>
+          <p:cNvSpPr txBox="1"/>
+          <p:nvPr/>
+        </p:nvSpPr>
+        <p:spPr>
+          <a:xfrm>
+            <a:off x="1660375" y="4152911"/>
+            <a:ext cx="3537250" cy="276999"/>
+          </a:xfrm>
+          <a:prstGeom prst="rect">
+            <a:avLst/>
+          </a:prstGeom>
+          <a:noFill/>
+        </p:spPr>
+        <p:txBody>
+          <a:bodyPr wrap="none" rtlCol="0">
+            <a:spAutoFit/>
+          </a:bodyPr>
+          <a:lstStyle/>
+          <a:p>
+            <a:r>
+              <a:rPr lang="en-US" sz="1200" u="sng" dirty="0">
+                <a:latin typeface="Times New Roman" panose="02020603050405020304" pitchFamily="18" charset="0"/>
+                <a:cs typeface="Times New Roman" panose="02020603050405020304" pitchFamily="18" charset="0"/>
+              </a:rPr>
+              <a:t>Agreement Assessment and Landscape Patch Analysis</a:t>
             </a:r>
           </a:p>
         </p:txBody>

</xml_diff>